<commit_message>
fixed adresses and mailtext
</commit_message>
<xml_diff>
--- a/Mobiles_Unfallprotokoll.pptx
+++ b/Mobiles_Unfallprotokoll.pptx
@@ -251,7 +251,7 @@
           <a:p>
             <a:fld id="{FA92AA18-E25F-4B78-A618-20E6926A8B99}" type="datetimeFigureOut">
               <a:rPr lang="en-US" smtClean="0"/>
-              <a:t>5/12/2016</a:t>
+              <a:t>5/13/2016</a:t>
             </a:fld>
             <a:endParaRPr lang="en-US"/>
           </a:p>
@@ -421,7 +421,7 @@
           <a:p>
             <a:fld id="{FA92AA18-E25F-4B78-A618-20E6926A8B99}" type="datetimeFigureOut">
               <a:rPr lang="en-US" smtClean="0"/>
-              <a:t>5/12/2016</a:t>
+              <a:t>5/13/2016</a:t>
             </a:fld>
             <a:endParaRPr lang="en-US"/>
           </a:p>
@@ -601,7 +601,7 @@
           <a:p>
             <a:fld id="{FA92AA18-E25F-4B78-A618-20E6926A8B99}" type="datetimeFigureOut">
               <a:rPr lang="en-US" smtClean="0"/>
-              <a:t>5/12/2016</a:t>
+              <a:t>5/13/2016</a:t>
             </a:fld>
             <a:endParaRPr lang="en-US"/>
           </a:p>
@@ -771,7 +771,7 @@
           <a:p>
             <a:fld id="{FA92AA18-E25F-4B78-A618-20E6926A8B99}" type="datetimeFigureOut">
               <a:rPr lang="en-US" smtClean="0"/>
-              <a:t>5/12/2016</a:t>
+              <a:t>5/13/2016</a:t>
             </a:fld>
             <a:endParaRPr lang="en-US"/>
           </a:p>
@@ -1017,7 +1017,7 @@
           <a:p>
             <a:fld id="{FA92AA18-E25F-4B78-A618-20E6926A8B99}" type="datetimeFigureOut">
               <a:rPr lang="en-US" smtClean="0"/>
-              <a:t>5/12/2016</a:t>
+              <a:t>5/13/2016</a:t>
             </a:fld>
             <a:endParaRPr lang="en-US"/>
           </a:p>
@@ -1249,7 +1249,7 @@
           <a:p>
             <a:fld id="{FA92AA18-E25F-4B78-A618-20E6926A8B99}" type="datetimeFigureOut">
               <a:rPr lang="en-US" smtClean="0"/>
-              <a:t>5/12/2016</a:t>
+              <a:t>5/13/2016</a:t>
             </a:fld>
             <a:endParaRPr lang="en-US"/>
           </a:p>
@@ -1616,7 +1616,7 @@
           <a:p>
             <a:fld id="{FA92AA18-E25F-4B78-A618-20E6926A8B99}" type="datetimeFigureOut">
               <a:rPr lang="en-US" smtClean="0"/>
-              <a:t>5/12/2016</a:t>
+              <a:t>5/13/2016</a:t>
             </a:fld>
             <a:endParaRPr lang="en-US"/>
           </a:p>
@@ -1734,7 +1734,7 @@
           <a:p>
             <a:fld id="{FA92AA18-E25F-4B78-A618-20E6926A8B99}" type="datetimeFigureOut">
               <a:rPr lang="en-US" smtClean="0"/>
-              <a:t>5/12/2016</a:t>
+              <a:t>5/13/2016</a:t>
             </a:fld>
             <a:endParaRPr lang="en-US"/>
           </a:p>
@@ -1829,7 +1829,7 @@
           <a:p>
             <a:fld id="{FA92AA18-E25F-4B78-A618-20E6926A8B99}" type="datetimeFigureOut">
               <a:rPr lang="en-US" smtClean="0"/>
-              <a:t>5/12/2016</a:t>
+              <a:t>5/13/2016</a:t>
             </a:fld>
             <a:endParaRPr lang="en-US"/>
           </a:p>
@@ -2106,7 +2106,7 @@
           <a:p>
             <a:fld id="{FA92AA18-E25F-4B78-A618-20E6926A8B99}" type="datetimeFigureOut">
               <a:rPr lang="en-US" smtClean="0"/>
-              <a:t>5/12/2016</a:t>
+              <a:t>5/13/2016</a:t>
             </a:fld>
             <a:endParaRPr lang="en-US"/>
           </a:p>
@@ -2359,7 +2359,7 @@
           <a:p>
             <a:fld id="{FA92AA18-E25F-4B78-A618-20E6926A8B99}" type="datetimeFigureOut">
               <a:rPr lang="en-US" smtClean="0"/>
-              <a:t>5/12/2016</a:t>
+              <a:t>5/13/2016</a:t>
             </a:fld>
             <a:endParaRPr lang="en-US"/>
           </a:p>
@@ -2572,7 +2572,7 @@
           <a:p>
             <a:fld id="{FA92AA18-E25F-4B78-A618-20E6926A8B99}" type="datetimeFigureOut">
               <a:rPr lang="en-US" smtClean="0"/>
-              <a:t>5/12/2016</a:t>
+              <a:t>5/13/2016</a:t>
             </a:fld>
             <a:endParaRPr lang="en-US"/>
           </a:p>
@@ -3138,28 +3138,22 @@
       </p:grpSpPr>
       <p:pic>
         <p:nvPicPr>
-          <p:cNvPr id="6" name="Picture 5"/>
+          <p:cNvPr id="2" name="Picture 1"/>
           <p:cNvPicPr>
             <a:picLocks noChangeAspect="1"/>
           </p:cNvPicPr>
           <p:nvPr/>
         </p:nvPicPr>
         <p:blipFill>
-          <a:blip r:embed="rId2">
-            <a:extLst>
-              <a:ext uri="{28A0092B-C50C-407E-A947-70E740481C1C}">
-                <a14:useLocalDpi xmlns:a14="http://schemas.microsoft.com/office/drawing/2010/main" val="0"/>
-              </a:ext>
-            </a:extLst>
-          </a:blip>
+          <a:blip r:embed="rId2"/>
           <a:stretch>
             <a:fillRect/>
           </a:stretch>
         </p:blipFill>
         <p:spPr>
           <a:xfrm>
-            <a:off x="1838197" y="128877"/>
-            <a:ext cx="7194592" cy="6599177"/>
+            <a:off x="1561158" y="1339993"/>
+            <a:ext cx="8734425" cy="3028950"/>
           </a:xfrm>
           <a:prstGeom prst="rect">
             <a:avLst/>
@@ -3198,31 +3192,50 @@
       </p:grpSpPr>
       <p:pic>
         <p:nvPicPr>
-          <p:cNvPr id="4" name="Content Placeholder 3"/>
+          <p:cNvPr id="2" name="Picture 1"/>
           <p:cNvPicPr>
-            <a:picLocks noGrp="1" noChangeAspect="1"/>
+            <a:picLocks noChangeAspect="1"/>
           </p:cNvPicPr>
-          <p:nvPr>
-            <p:ph idx="1"/>
-          </p:nvPr>
+          <p:nvPr/>
         </p:nvPicPr>
         <p:blipFill>
-          <a:blip r:embed="rId2">
-            <a:extLst>
-              <a:ext uri="{28A0092B-C50C-407E-A947-70E740481C1C}">
-                <a14:useLocalDpi xmlns:a14="http://schemas.microsoft.com/office/drawing/2010/main" val="0"/>
-              </a:ext>
-            </a:extLst>
-          </a:blip>
+          <a:blip r:embed="rId2"/>
           <a:stretch>
             <a:fillRect/>
           </a:stretch>
         </p:blipFill>
         <p:spPr>
           <a:xfrm>
-            <a:off x="2693520" y="0"/>
-            <a:ext cx="5778404" cy="6858000"/>
+            <a:off x="2239653" y="3417775"/>
+            <a:ext cx="7153275" cy="1533525"/>
           </a:xfrm>
+          <a:prstGeom prst="rect">
+            <a:avLst/>
+          </a:prstGeom>
+        </p:spPr>
+      </p:pic>
+      <p:pic>
+        <p:nvPicPr>
+          <p:cNvPr id="3" name="Picture 2"/>
+          <p:cNvPicPr>
+            <a:picLocks noChangeAspect="1"/>
+          </p:cNvPicPr>
+          <p:nvPr/>
+        </p:nvPicPr>
+        <p:blipFill>
+          <a:blip r:embed="rId3"/>
+          <a:stretch>
+            <a:fillRect/>
+          </a:stretch>
+        </p:blipFill>
+        <p:spPr>
+          <a:xfrm>
+            <a:off x="2577791" y="749940"/>
+            <a:ext cx="6477000" cy="1924050"/>
+          </a:xfrm>
+          <a:prstGeom prst="rect">
+            <a:avLst/>
+          </a:prstGeom>
         </p:spPr>
       </p:pic>
     </p:spTree>

</xml_diff>